<commit_message>
update pres for itgm
</commit_message>
<xml_diff>
--- a/2019_VisualStudio-And-Docker/Presentation.pptx
+++ b/2019_VisualStudio-And-Docker/Presentation.pptx
@@ -18571,7 +18571,7 @@
           <a:p>
             <a:fld id="{532C2021-6E76-4960-8582-B0260C63743B}" type="datetimeFigureOut">
               <a:rPr lang="en-US" smtClean="0"/>
-              <a:t>2019-02-28</a:t>
+              <a:t>3/21/2019</a:t>
             </a:fld>
             <a:endParaRPr lang="en-US"/>
           </a:p>
@@ -19601,7 +19601,7 @@
           <a:p>
             <a:fld id="{EA1A4DEF-7190-4A79-9BA3-D881542BAA8A}" type="datetimeFigureOut">
               <a:rPr lang="en-US" smtClean="0"/>
-              <a:t>2019-02-28</a:t>
+              <a:t>3/21/2019</a:t>
             </a:fld>
             <a:endParaRPr lang="en-US"/>
           </a:p>
@@ -19799,7 +19799,7 @@
           <a:p>
             <a:fld id="{EA1A4DEF-7190-4A79-9BA3-D881542BAA8A}" type="datetimeFigureOut">
               <a:rPr lang="en-US" smtClean="0"/>
-              <a:t>2019-02-28</a:t>
+              <a:t>3/21/2019</a:t>
             </a:fld>
             <a:endParaRPr lang="en-US"/>
           </a:p>
@@ -20007,7 +20007,7 @@
           <a:p>
             <a:fld id="{EA1A4DEF-7190-4A79-9BA3-D881542BAA8A}" type="datetimeFigureOut">
               <a:rPr lang="en-US" smtClean="0"/>
-              <a:t>2019-02-28</a:t>
+              <a:t>3/21/2019</a:t>
             </a:fld>
             <a:endParaRPr lang="en-US"/>
           </a:p>
@@ -20205,7 +20205,7 @@
           <a:p>
             <a:fld id="{EA1A4DEF-7190-4A79-9BA3-D881542BAA8A}" type="datetimeFigureOut">
               <a:rPr lang="en-US" smtClean="0"/>
-              <a:t>2019-02-28</a:t>
+              <a:t>3/21/2019</a:t>
             </a:fld>
             <a:endParaRPr lang="en-US"/>
           </a:p>
@@ -20480,7 +20480,7 @@
           <a:p>
             <a:fld id="{EA1A4DEF-7190-4A79-9BA3-D881542BAA8A}" type="datetimeFigureOut">
               <a:rPr lang="en-US" smtClean="0"/>
-              <a:t>2019-02-28</a:t>
+              <a:t>3/21/2019</a:t>
             </a:fld>
             <a:endParaRPr lang="en-US"/>
           </a:p>
@@ -20745,7 +20745,7 @@
           <a:p>
             <a:fld id="{EA1A4DEF-7190-4A79-9BA3-D881542BAA8A}" type="datetimeFigureOut">
               <a:rPr lang="en-US" smtClean="0"/>
-              <a:t>2019-02-28</a:t>
+              <a:t>3/21/2019</a:t>
             </a:fld>
             <a:endParaRPr lang="en-US"/>
           </a:p>
@@ -21157,7 +21157,7 @@
           <a:p>
             <a:fld id="{EA1A4DEF-7190-4A79-9BA3-D881542BAA8A}" type="datetimeFigureOut">
               <a:rPr lang="en-US" smtClean="0"/>
-              <a:t>2019-02-28</a:t>
+              <a:t>3/21/2019</a:t>
             </a:fld>
             <a:endParaRPr lang="en-US"/>
           </a:p>
@@ -21298,7 +21298,7 @@
           <a:p>
             <a:fld id="{EA1A4DEF-7190-4A79-9BA3-D881542BAA8A}" type="datetimeFigureOut">
               <a:rPr lang="en-US" smtClean="0"/>
-              <a:t>2019-02-28</a:t>
+              <a:t>3/21/2019</a:t>
             </a:fld>
             <a:endParaRPr lang="en-US"/>
           </a:p>
@@ -21411,7 +21411,7 @@
           <a:p>
             <a:fld id="{EA1A4DEF-7190-4A79-9BA3-D881542BAA8A}" type="datetimeFigureOut">
               <a:rPr lang="en-US" smtClean="0"/>
-              <a:t>2019-02-28</a:t>
+              <a:t>3/21/2019</a:t>
             </a:fld>
             <a:endParaRPr lang="en-US"/>
           </a:p>
@@ -21722,7 +21722,7 @@
           <a:p>
             <a:fld id="{EA1A4DEF-7190-4A79-9BA3-D881542BAA8A}" type="datetimeFigureOut">
               <a:rPr lang="en-US" smtClean="0"/>
-              <a:t>2019-02-28</a:t>
+              <a:t>3/21/2019</a:t>
             </a:fld>
             <a:endParaRPr lang="en-US"/>
           </a:p>
@@ -22010,7 +22010,7 @@
           <a:p>
             <a:fld id="{EA1A4DEF-7190-4A79-9BA3-D881542BAA8A}" type="datetimeFigureOut">
               <a:rPr lang="en-US" smtClean="0"/>
-              <a:t>2019-02-28</a:t>
+              <a:t>3/21/2019</a:t>
             </a:fld>
             <a:endParaRPr lang="en-US"/>
           </a:p>
@@ -22251,7 +22251,7 @@
           <a:p>
             <a:fld id="{EA1A4DEF-7190-4A79-9BA3-D881542BAA8A}" type="datetimeFigureOut">
               <a:rPr lang="en-US" smtClean="0"/>
-              <a:t>2019-02-28</a:t>
+              <a:t>3/21/2019</a:t>
             </a:fld>
             <a:endParaRPr lang="en-US"/>
           </a:p>
@@ -28745,7 +28745,11 @@
           <a:bodyPr/>
           <a:lstStyle/>
           <a:p>
-            <a:endParaRPr lang="en-US"/>
+            <a:r>
+              <a:rPr lang="ru-RU" dirty="0"/>
+              <a:t>Контейнерная революция</a:t>
+            </a:r>
+            <a:endParaRPr lang="en-US" dirty="0"/>
           </a:p>
         </p:txBody>
       </p:sp>
@@ -28770,14 +28774,9 @@
           <a:bodyPr/>
           <a:lstStyle/>
           <a:p>
-            <a:r>
-              <a:rPr lang="en-US" dirty="0"/>
-              <a:t>TODO: </a:t>
-            </a:r>
-            <a:r>
-              <a:rPr lang="ru-RU" dirty="0"/>
-              <a:t>слайд про что такое докер</a:t>
-            </a:r>
+            <a:pPr marL="0" indent="0">
+              <a:buNone/>
+            </a:pPr>
             <a:endParaRPr lang="en-US" dirty="0"/>
           </a:p>
         </p:txBody>

</xml_diff>